<commit_message>
Generate ML fundamentals presentation
</commit_message>
<xml_diff>
--- a/ml_fundamentals.pptx
+++ b/ml_fundamentals.pptx
@@ -3134,7 +3134,17 @@
           <a:lstStyle/>
           <a:p>
             <a:r>
-              <a:t>Core concepts and overview</a:t>
+              <a:t>What ML is</a:t>
+            </a:r>
+          </a:p>
+          <a:p>
+            <a:r>
+              <a:t>Why it matters</a:t>
+            </a:r>
+          </a:p>
+          <a:p>
+            <a:r>
+              <a:t>Where it is used</a:t>
             </a:r>
           </a:p>
         </p:txBody>
@@ -3173,7 +3183,7 @@
           <a:lstStyle/>
           <a:p>
             <a:r>
-              <a:t>Applications</a:t>
+              <a:t>Key Takeaways</a:t>
             </a:r>
           </a:p>
         </p:txBody>
@@ -3194,7 +3204,17 @@
           <a:lstStyle/>
           <a:p>
             <a:r>
-              <a:t>Finance, healthcare, marketing</a:t>
+              <a:t>ML learns from data</a:t>
+            </a:r>
+          </a:p>
+          <a:p>
+            <a:r>
+              <a:t>Different learning types</a:t>
+            </a:r>
+          </a:p>
+          <a:p>
+            <a:r>
+              <a:t>Used across industries</a:t>
             </a:r>
           </a:p>
         </p:txBody>
@@ -3254,7 +3274,17 @@
           <a:lstStyle/>
           <a:p>
             <a:r>
-              <a:t>Learning patterns from data</a:t>
+              <a:t>Algorithms that learn patterns</a:t>
+            </a:r>
+          </a:p>
+          <a:p>
+            <a:r>
+              <a:t>Improve with data</a:t>
+            </a:r>
+          </a:p>
+          <a:p>
+            <a:r>
+              <a:t>Make predictions or decisions</a:t>
             </a:r>
           </a:p>
         </p:txBody>
@@ -3314,7 +3344,17 @@
           <a:lstStyle/>
           <a:p>
             <a:r>
-              <a:t>Supervised, Unsupervised, Reinforcement</a:t>
+              <a:t>Supervised learning</a:t>
+            </a:r>
+          </a:p>
+          <a:p>
+            <a:r>
+              <a:t>Unsupervised learning</a:t>
+            </a:r>
+          </a:p>
+          <a:p>
+            <a:r>
+              <a:t>Reinforcement learning</a:t>
             </a:r>
           </a:p>
         </p:txBody>
@@ -3374,7 +3414,17 @@
           <a:lstStyle/>
           <a:p>
             <a:r>
-              <a:t>Regression and classification</a:t>
+              <a:t>Uses labelled data</a:t>
+            </a:r>
+          </a:p>
+          <a:p>
+            <a:r>
+              <a:t>Regression &amp; classification</a:t>
+            </a:r>
+          </a:p>
+          <a:p>
+            <a:r>
+              <a:t>Examples: spam detection, price prediction</a:t>
             </a:r>
           </a:p>
         </p:txBody>
@@ -3434,7 +3484,17 @@
           <a:lstStyle/>
           <a:p>
             <a:r>
-              <a:t>Clustering and dimensionality reduction</a:t>
+              <a:t>No labelled outputs</a:t>
+            </a:r>
+          </a:p>
+          <a:p>
+            <a:r>
+              <a:t>Pattern discovery</a:t>
+            </a:r>
+          </a:p>
+          <a:p>
+            <a:r>
+              <a:t>Examples: clustering customers</a:t>
             </a:r>
           </a:p>
         </p:txBody>
@@ -3494,7 +3554,17 @@
           <a:lstStyle/>
           <a:p>
             <a:r>
-              <a:t>Learning via rewards and penalties</a:t>
+              <a:t>Agent learns by rewards</a:t>
+            </a:r>
+          </a:p>
+          <a:p>
+            <a:r>
+              <a:t>Trial and error</a:t>
+            </a:r>
+          </a:p>
+          <a:p>
+            <a:r>
+              <a:t>Examples: games, robotics</a:t>
             </a:r>
           </a:p>
         </p:txBody>
@@ -3554,7 +3624,22 @@
           <a:lstStyle/>
           <a:p>
             <a:r>
-              <a:t>Linear Regression, Logistic Regression, Trees, KNN</a:t>
+              <a:t>Linear regression</a:t>
+            </a:r>
+          </a:p>
+          <a:p>
+            <a:r>
+              <a:t>Logistic regression</a:t>
+            </a:r>
+          </a:p>
+          <a:p>
+            <a:r>
+              <a:t>Decision trees</a:t>
+            </a:r>
+          </a:p>
+          <a:p>
+            <a:r>
+              <a:t>K-means</a:t>
             </a:r>
           </a:p>
         </p:txBody>
@@ -3593,7 +3678,7 @@
           <a:lstStyle/>
           <a:p>
             <a:r>
-              <a:t>Model Training</a:t>
+              <a:t>Model Training Process</a:t>
             </a:r>
           </a:p>
         </p:txBody>
@@ -3614,7 +3699,22 @@
           <a:lstStyle/>
           <a:p>
             <a:r>
-              <a:t>Train / validation / test split</a:t>
+              <a:t>Collect data</a:t>
+            </a:r>
+          </a:p>
+          <a:p>
+            <a:r>
+              <a:t>Train model</a:t>
+            </a:r>
+          </a:p>
+          <a:p>
+            <a:r>
+              <a:t>Evaluate performance</a:t>
+            </a:r>
+          </a:p>
+          <a:p>
+            <a:r>
+              <a:t>Deploy</a:t>
             </a:r>
           </a:p>
         </p:txBody>
@@ -3653,7 +3753,7 @@
           <a:lstStyle/>
           <a:p>
             <a:r>
-              <a:t>Evaluation Metrics</a:t>
+              <a:t>Overfitting vs Underfitting</a:t>
             </a:r>
           </a:p>
         </p:txBody>
@@ -3674,7 +3774,17 @@
           <a:lstStyle/>
           <a:p>
             <a:r>
-              <a:t>Accuracy, precision, recall</a:t>
+              <a:t>Overfitting: too complex</a:t>
+            </a:r>
+          </a:p>
+          <a:p>
+            <a:r>
+              <a:t>Underfitting: too simple</a:t>
+            </a:r>
+          </a:p>
+          <a:p>
+            <a:r>
+              <a:t>Bias–variance tradeoff</a:t>
             </a:r>
           </a:p>
         </p:txBody>

</xml_diff>